<commit_message>
OSSP-BINSU-7 제안서 발표자료 (04.24)
</commit_message>
<xml_diff>
--- a/Doc/제안서/제안서 발표자료_최종.pptx
+++ b/Doc/제안서/제안서 발표자료_최종.pptx
@@ -34,7 +34,7 @@
   <p:notesSz cx="6858000" cy="9144000"/>
   <p:embeddedFontLst>
     <p:embeddedFont>
-      <p:font typeface="KoPub돋움체 Medium" panose="020B0600000101010101" charset="-127"/>
+      <p:font typeface="KoPub돋움체 Medium" panose="00000600000000000000" pitchFamily="2" charset="-127"/>
       <p:regular r:id="rId24"/>
     </p:embeddedFont>
     <p:embeddedFont>
@@ -13899,7 +13899,7 @@
                 <a:latin typeface="카카오 Light" panose="020B0600000101010101" pitchFamily="50" charset="-127"/>
                 <a:ea typeface="카카오 Light" panose="020B0600000101010101" pitchFamily="50" charset="-127"/>
               </a:rPr>
-              <a:t>Anaconda</a:t>
+              <a:t>VS code</a:t>
             </a:r>
             <a:endParaRPr lang="ko-KR" altLang="en-US" sz="2000" dirty="0">
               <a:solidFill>
@@ -13961,7 +13961,7 @@
                 <a:latin typeface="카카오 Light" panose="020B0600000101010101" pitchFamily="50" charset="-127"/>
                 <a:ea typeface="카카오 Light" panose="020B0600000101010101" pitchFamily="50" charset="-127"/>
               </a:rPr>
-              <a:t>Windows</a:t>
+              <a:t>Ubuntu</a:t>
             </a:r>
             <a:endParaRPr lang="ko-KR" altLang="en-US" sz="2000" dirty="0">
               <a:solidFill>

</xml_diff>